<commit_message>
complex hold for db cache
</commit_message>
<xml_diff>
--- a/Docs/intro.pptx
+++ b/Docs/intro.pptx
@@ -18327,7 +18327,7 @@
           <a:p>
             <a:fld id="{23CEAAF3-9831-450B-8D59-2C09DB96C8FC}" type="datetimeFigureOut">
               <a:rPr lang="en-US"/>
-              <a:t>7/22/2021</a:t>
+              <a:t>7/30/2021</a:t>
             </a:fld>
             <a:endParaRPr/>
           </a:p>
@@ -18492,7 +18492,7 @@
           <a:p>
             <a:fld id="{2D50CD79-FC16-4410-AB61-17F26E6D3BC8}" type="datetimeFigureOut">
               <a:rPr lang="en-US"/>
-              <a:t>7/22/2021</a:t>
+              <a:t>7/30/2021</a:t>
             </a:fld>
             <a:endParaRPr/>
           </a:p>
@@ -19386,7 +19386,7 @@
             <a:fld id="{402B9795-92DC-40DC-A1CA-9A4B349D7824}" type="datetimeFigureOut">
               <a:rPr lang="en-US" smtClean="0"/>
               <a:pPr/>
-              <a:t>7/22/2021</a:t>
+              <a:t>7/30/2021</a:t>
             </a:fld>
             <a:endParaRPr lang="en-US" dirty="0"/>
           </a:p>
@@ -19680,7 +19680,7 @@
           <a:p>
             <a:fld id="{402B9795-92DC-40DC-A1CA-9A4B349D7824}" type="datetimeFigureOut">
               <a:rPr lang="en-US"/>
-              <a:t>7/22/2021</a:t>
+              <a:t>7/30/2021</a:t>
             </a:fld>
             <a:endParaRPr/>
           </a:p>
@@ -19862,7 +19862,7 @@
           <a:p>
             <a:fld id="{402B9795-92DC-40DC-A1CA-9A4B349D7824}" type="datetimeFigureOut">
               <a:rPr lang="en-US"/>
-              <a:t>7/22/2021</a:t>
+              <a:t>7/30/2021</a:t>
             </a:fld>
             <a:endParaRPr/>
           </a:p>
@@ -20054,7 +20054,7 @@
           <a:p>
             <a:fld id="{402B9795-92DC-40DC-A1CA-9A4B349D7824}" type="datetimeFigureOut">
               <a:rPr lang="en-US"/>
-              <a:t>7/22/2021</a:t>
+              <a:t>7/30/2021</a:t>
             </a:fld>
             <a:endParaRPr/>
           </a:p>
@@ -20323,7 +20323,7 @@
           <a:p>
             <a:fld id="{402B9795-92DC-40DC-A1CA-9A4B349D7824}" type="datetimeFigureOut">
               <a:rPr lang="en-US"/>
-              <a:t>7/22/2021</a:t>
+              <a:t>7/30/2021</a:t>
             </a:fld>
             <a:endParaRPr/>
           </a:p>
@@ -21352,7 +21352,7 @@
           <a:p>
             <a:fld id="{402B9795-92DC-40DC-A1CA-9A4B349D7824}" type="datetimeFigureOut">
               <a:rPr lang="en-US"/>
-              <a:t>7/22/2021</a:t>
+              <a:t>7/30/2021</a:t>
             </a:fld>
             <a:endParaRPr/>
           </a:p>
@@ -21625,7 +21625,7 @@
           <a:p>
             <a:fld id="{402B9795-92DC-40DC-A1CA-9A4B349D7824}" type="datetimeFigureOut">
               <a:rPr lang="en-US"/>
-              <a:t>7/22/2021</a:t>
+              <a:t>7/30/2021</a:t>
             </a:fld>
             <a:endParaRPr/>
           </a:p>
@@ -22005,7 +22005,7 @@
           <a:p>
             <a:fld id="{402B9795-92DC-40DC-A1CA-9A4B349D7824}" type="datetimeFigureOut">
               <a:rPr lang="en-US"/>
-              <a:t>7/22/2021</a:t>
+              <a:t>7/30/2021</a:t>
             </a:fld>
             <a:endParaRPr/>
           </a:p>
@@ -22135,7 +22135,7 @@
           <a:p>
             <a:fld id="{402B9795-92DC-40DC-A1CA-9A4B349D7824}" type="datetimeFigureOut">
               <a:rPr lang="en-US"/>
-              <a:t>7/22/2021</a:t>
+              <a:t>7/30/2021</a:t>
             </a:fld>
             <a:endParaRPr/>
           </a:p>
@@ -22242,7 +22242,7 @@
           <a:p>
             <a:fld id="{402B9795-92DC-40DC-A1CA-9A4B349D7824}" type="datetimeFigureOut">
               <a:rPr lang="en-US"/>
-              <a:t>7/22/2021</a:t>
+              <a:t>7/30/2021</a:t>
             </a:fld>
             <a:endParaRPr/>
           </a:p>
@@ -22533,7 +22533,7 @@
           <a:p>
             <a:fld id="{402B9795-92DC-40DC-A1CA-9A4B349D7824}" type="datetimeFigureOut">
               <a:rPr lang="en-US"/>
-              <a:t>7/22/2021</a:t>
+              <a:t>7/30/2021</a:t>
             </a:fld>
             <a:endParaRPr/>
           </a:p>
@@ -22759,7 +22759,7 @@
             <a:fld id="{402B9795-92DC-40DC-A1CA-9A4B349D7824}" type="datetimeFigureOut">
               <a:rPr lang="en-US" smtClean="0"/>
               <a:pPr/>
-              <a:t>7/22/2021</a:t>
+              <a:t>7/30/2021</a:t>
             </a:fld>
             <a:endParaRPr lang="en-US"/>
           </a:p>
@@ -23403,7 +23403,7 @@
                 <a:latin typeface="微软雅黑" panose="020B0503020204020204" pitchFamily="34" charset="-122"/>
                 <a:ea typeface="微软雅黑" panose="020B0503020204020204" pitchFamily="34" charset="-122"/>
               </a:rPr>
-              <a:t>内建区块链网络和物联网机制的基础框架，用于开发面向行业的供应链平台应用</a:t>
+              <a:t>内建了区块链网络和物联网机制的基础框架，用于开发面向行业的供应链平台应用</a:t>
             </a:r>
             <a:endParaRPr lang="en-US" altLang="zh-CN" sz="2000" dirty="0">
               <a:latin typeface="微软雅黑" panose="020B0503020204020204" pitchFamily="34" charset="-122"/>
@@ -26352,7 +26352,7 @@
                 <a:latin typeface="微软雅黑" panose="020B0503020204020204" pitchFamily="34" charset="-122"/>
                 <a:ea typeface="微软雅黑" panose="020B0503020204020204" pitchFamily="34" charset="-122"/>
               </a:rPr>
-              <a:t>是指面向某一行业或领域的供应链管理的而搭建的开放型互联网平台，它可以整合处在同一供应链上的各种关键资源和各个参与主体，使之独立，高效，信任，协同地完成各个环节的经营工作</a:t>
+              <a:t>是指面向某一行业或领域的供应链管理而搭建的开放型互联网平台，它可以整合处在同一供应链上的各种关键资源以及参与主体，使之独立，高效，信任，协同地完成各个环节的经营及作业活动</a:t>
             </a:r>
             <a:endParaRPr lang="en-US" sz="1800" dirty="0">
               <a:solidFill>
@@ -26582,7 +26582,7 @@
                 <a:latin typeface="微软雅黑" panose="020B0503020204020204" pitchFamily="34" charset="-122"/>
                 <a:ea typeface="微软雅黑" panose="020B0503020204020204" pitchFamily="34" charset="-122"/>
               </a:rPr>
-              <a:t>供应链具有行业，地域，资源分布的复杂性，中心化的管理平台难以适用；相反，以去中心化的思维，围绕地域来搭建平台节点，整合已有的各类资源，顺势而为，则更具有实操性。地域的节点是独立运营的，也能相互联盟成网，既维护各自的利益及在行业内的平衡，又实现了关键数据的分布共享</a:t>
+              <a:t>供应链具有行业，地域，资源分布的复杂性，中心化的平台思维很不适用；相反，以去中心化的思维，围绕地域来搭建平台节点，整合已有的各类资源，顺势而为，则更具有实操性。地域的节点是独立运营的，且能够相互联盟成网，在保证各自的权益的同时又实现了必要的共享</a:t>
             </a:r>
             <a:endParaRPr lang="en-US" altLang="zh-CN" sz="1800" dirty="0">
               <a:solidFill>
@@ -30190,132 +30190,6 @@
 </file>
 
 <file path=customXml/item2.xml><?xml version="1.0" encoding="utf-8"?>
-<p:properties xmlns:p="http://schemas.microsoft.com/office/2006/metadata/properties" xmlns:xsi="http://www.w3.org/2001/XMLSchema-instance" xmlns:pc="http://schemas.microsoft.com/office/infopath/2007/PartnerControls">
-  <documentManagement>
-    <APDescription xmlns="4873beb7-5857-4685-be1f-d57550cc96cc" xsi:nil="true"/>
-    <AssetExpire xmlns="4873beb7-5857-4685-be1f-d57550cc96cc">2029-01-01T08:00:00+00:00</AssetExpire>
-    <CampaignTagsTaxHTField0 xmlns="4873beb7-5857-4685-be1f-d57550cc96cc">
-      <Terms xmlns="http://schemas.microsoft.com/office/infopath/2007/PartnerControls"/>
-    </CampaignTagsTaxHTField0>
-    <IntlLangReviewDate xmlns="4873beb7-5857-4685-be1f-d57550cc96cc" xsi:nil="true"/>
-    <TPFriendlyName xmlns="4873beb7-5857-4685-be1f-d57550cc96cc" xsi:nil="true"/>
-    <IntlLangReview xmlns="4873beb7-5857-4685-be1f-d57550cc96cc">false</IntlLangReview>
-    <LocLastLocAttemptVersionLookup xmlns="4873beb7-5857-4685-be1f-d57550cc96cc">855024</LocLastLocAttemptVersionLookup>
-    <PolicheckWords xmlns="4873beb7-5857-4685-be1f-d57550cc96cc" xsi:nil="true"/>
-    <SubmitterId xmlns="4873beb7-5857-4685-be1f-d57550cc96cc" xsi:nil="true"/>
-    <AcquiredFrom xmlns="4873beb7-5857-4685-be1f-d57550cc96cc">Internal MS</AcquiredFrom>
-    <EditorialStatus xmlns="4873beb7-5857-4685-be1f-d57550cc96cc">Complete</EditorialStatus>
-    <Markets xmlns="4873beb7-5857-4685-be1f-d57550cc96cc"/>
-    <OriginAsset xmlns="4873beb7-5857-4685-be1f-d57550cc96cc" xsi:nil="true"/>
-    <AssetStart xmlns="4873beb7-5857-4685-be1f-d57550cc96cc">2012-08-31T08:50:00+00:00</AssetStart>
-    <FriendlyTitle xmlns="4873beb7-5857-4685-be1f-d57550cc96cc" xsi:nil="true"/>
-    <MarketSpecific xmlns="4873beb7-5857-4685-be1f-d57550cc96cc">false</MarketSpecific>
-    <TPNamespace xmlns="4873beb7-5857-4685-be1f-d57550cc96cc" xsi:nil="true"/>
-    <PublishStatusLookup xmlns="4873beb7-5857-4685-be1f-d57550cc96cc">
-      <Value>1616423</Value>
-    </PublishStatusLookup>
-    <APAuthor xmlns="4873beb7-5857-4685-be1f-d57550cc96cc">
-      <UserInfo>
-        <DisplayName>REDMOND\kristaa</DisplayName>
-        <AccountId>136</AccountId>
-        <AccountType/>
-      </UserInfo>
-    </APAuthor>
-    <TPCommandLine xmlns="4873beb7-5857-4685-be1f-d57550cc96cc" xsi:nil="true"/>
-    <IntlLangReviewer xmlns="4873beb7-5857-4685-be1f-d57550cc96cc" xsi:nil="true"/>
-    <OpenTemplate xmlns="4873beb7-5857-4685-be1f-d57550cc96cc">true</OpenTemplate>
-    <CSXSubmissionDate xmlns="4873beb7-5857-4685-be1f-d57550cc96cc" xsi:nil="true"/>
-    <TaxCatchAll xmlns="4873beb7-5857-4685-be1f-d57550cc96cc"/>
-    <Manager xmlns="4873beb7-5857-4685-be1f-d57550cc96cc" xsi:nil="true"/>
-    <NumericId xmlns="4873beb7-5857-4685-be1f-d57550cc96cc" xsi:nil="true"/>
-    <ParentAssetId xmlns="4873beb7-5857-4685-be1f-d57550cc96cc" xsi:nil="true"/>
-    <OriginalSourceMarket xmlns="4873beb7-5857-4685-be1f-d57550cc96cc" xsi:nil="true"/>
-    <ApprovalStatus xmlns="4873beb7-5857-4685-be1f-d57550cc96cc">InProgress</ApprovalStatus>
-    <TPComponent xmlns="4873beb7-5857-4685-be1f-d57550cc96cc" xsi:nil="true"/>
-    <EditorialTags xmlns="4873beb7-5857-4685-be1f-d57550cc96cc" xsi:nil="true"/>
-    <TPExecutable xmlns="4873beb7-5857-4685-be1f-d57550cc96cc" xsi:nil="true"/>
-    <TPLaunchHelpLink xmlns="4873beb7-5857-4685-be1f-d57550cc96cc" xsi:nil="true"/>
-    <LocComments xmlns="4873beb7-5857-4685-be1f-d57550cc96cc" xsi:nil="true"/>
-    <LocRecommendedHandoff xmlns="4873beb7-5857-4685-be1f-d57550cc96cc" xsi:nil="true"/>
-    <SourceTitle xmlns="4873beb7-5857-4685-be1f-d57550cc96cc" xsi:nil="true"/>
-    <CSXUpdate xmlns="4873beb7-5857-4685-be1f-d57550cc96cc">false</CSXUpdate>
-    <IntlLocPriority xmlns="4873beb7-5857-4685-be1f-d57550cc96cc" xsi:nil="true"/>
-    <UAProjectedTotalWords xmlns="4873beb7-5857-4685-be1f-d57550cc96cc" xsi:nil="true"/>
-    <AssetType xmlns="4873beb7-5857-4685-be1f-d57550cc96cc">TP</AssetType>
-    <MachineTranslated xmlns="4873beb7-5857-4685-be1f-d57550cc96cc">false</MachineTranslated>
-    <OutputCachingOn xmlns="4873beb7-5857-4685-be1f-d57550cc96cc">false</OutputCachingOn>
-    <TemplateStatus xmlns="4873beb7-5857-4685-be1f-d57550cc96cc">Complete</TemplateStatus>
-    <IsSearchable xmlns="4873beb7-5857-4685-be1f-d57550cc96cc">true</IsSearchable>
-    <ContentItem xmlns="4873beb7-5857-4685-be1f-d57550cc96cc" xsi:nil="true"/>
-    <HandoffToMSDN xmlns="4873beb7-5857-4685-be1f-d57550cc96cc" xsi:nil="true"/>
-    <ShowIn xmlns="4873beb7-5857-4685-be1f-d57550cc96cc">Show everywhere</ShowIn>
-    <ThumbnailAssetId xmlns="4873beb7-5857-4685-be1f-d57550cc96cc" xsi:nil="true"/>
-    <UALocComments xmlns="4873beb7-5857-4685-be1f-d57550cc96cc" xsi:nil="true"/>
-    <UALocRecommendation xmlns="4873beb7-5857-4685-be1f-d57550cc96cc">Localize</UALocRecommendation>
-    <LastModifiedDateTime xmlns="4873beb7-5857-4685-be1f-d57550cc96cc" xsi:nil="true"/>
-    <LegacyData xmlns="4873beb7-5857-4685-be1f-d57550cc96cc" xsi:nil="true"/>
-    <LocManualTestRequired xmlns="4873beb7-5857-4685-be1f-d57550cc96cc">false</LocManualTestRequired>
-    <LocMarketGroupTiers2 xmlns="4873beb7-5857-4685-be1f-d57550cc96cc" xsi:nil="true"/>
-    <ClipArtFilename xmlns="4873beb7-5857-4685-be1f-d57550cc96cc" xsi:nil="true"/>
-    <TPApplication xmlns="4873beb7-5857-4685-be1f-d57550cc96cc" xsi:nil="true"/>
-    <CSXHash xmlns="4873beb7-5857-4685-be1f-d57550cc96cc" xsi:nil="true"/>
-    <DirectSourceMarket xmlns="4873beb7-5857-4685-be1f-d57550cc96cc" xsi:nil="true"/>
-    <PrimaryImageGen xmlns="4873beb7-5857-4685-be1f-d57550cc96cc">true</PrimaryImageGen>
-    <PlannedPubDate xmlns="4873beb7-5857-4685-be1f-d57550cc96cc" xsi:nil="true"/>
-    <CSXSubmissionMarket xmlns="4873beb7-5857-4685-be1f-d57550cc96cc" xsi:nil="true"/>
-    <Downloads xmlns="4873beb7-5857-4685-be1f-d57550cc96cc">0</Downloads>
-    <ArtSampleDocs xmlns="4873beb7-5857-4685-be1f-d57550cc96cc" xsi:nil="true"/>
-    <TrustLevel xmlns="4873beb7-5857-4685-be1f-d57550cc96cc">1 Microsoft Managed Content</TrustLevel>
-    <BlockPublish xmlns="4873beb7-5857-4685-be1f-d57550cc96cc">false</BlockPublish>
-    <TPLaunchHelpLinkType xmlns="4873beb7-5857-4685-be1f-d57550cc96cc">Template</TPLaunchHelpLinkType>
-    <LocalizationTagsTaxHTField0 xmlns="4873beb7-5857-4685-be1f-d57550cc96cc">
-      <Terms xmlns="http://schemas.microsoft.com/office/infopath/2007/PartnerControls"/>
-    </LocalizationTagsTaxHTField0>
-    <BusinessGroup xmlns="4873beb7-5857-4685-be1f-d57550cc96cc" xsi:nil="true"/>
-    <Providers xmlns="4873beb7-5857-4685-be1f-d57550cc96cc" xsi:nil="true"/>
-    <TemplateTemplateType xmlns="4873beb7-5857-4685-be1f-d57550cc96cc">PowerPoint Presentation Template</TemplateTemplateType>
-    <TimesCloned xmlns="4873beb7-5857-4685-be1f-d57550cc96cc" xsi:nil="true"/>
-    <TPAppVersion xmlns="4873beb7-5857-4685-be1f-d57550cc96cc" xsi:nil="true"/>
-    <VoteCount xmlns="4873beb7-5857-4685-be1f-d57550cc96cc" xsi:nil="true"/>
-    <AverageRating xmlns="4873beb7-5857-4685-be1f-d57550cc96cc" xsi:nil="true"/>
-    <FeatureTagsTaxHTField0 xmlns="4873beb7-5857-4685-be1f-d57550cc96cc">
-      <Terms xmlns="http://schemas.microsoft.com/office/infopath/2007/PartnerControls"/>
-    </FeatureTagsTaxHTField0>
-    <Provider xmlns="4873beb7-5857-4685-be1f-d57550cc96cc" xsi:nil="true"/>
-    <UACurrentWords xmlns="4873beb7-5857-4685-be1f-d57550cc96cc" xsi:nil="true"/>
-    <AssetId xmlns="4873beb7-5857-4685-be1f-d57550cc96cc">TP103431361</AssetId>
-    <TPClientViewer xmlns="4873beb7-5857-4685-be1f-d57550cc96cc" xsi:nil="true"/>
-    <DSATActionTaken xmlns="4873beb7-5857-4685-be1f-d57550cc96cc" xsi:nil="true"/>
-    <APEditor xmlns="4873beb7-5857-4685-be1f-d57550cc96cc">
-      <UserInfo>
-        <DisplayName/>
-        <AccountId xsi:nil="true"/>
-        <AccountType/>
-      </UserInfo>
-    </APEditor>
-    <TPInstallLocation xmlns="4873beb7-5857-4685-be1f-d57550cc96cc" xsi:nil="true"/>
-    <OOCacheId xmlns="4873beb7-5857-4685-be1f-d57550cc96cc" xsi:nil="true"/>
-    <IsDeleted xmlns="4873beb7-5857-4685-be1f-d57550cc96cc">false</IsDeleted>
-    <PublishTargets xmlns="4873beb7-5857-4685-be1f-d57550cc96cc">OfficeOnlineVNext</PublishTargets>
-    <ApprovalLog xmlns="4873beb7-5857-4685-be1f-d57550cc96cc" xsi:nil="true"/>
-    <BugNumber xmlns="4873beb7-5857-4685-be1f-d57550cc96cc" xsi:nil="true"/>
-    <CrawlForDependencies xmlns="4873beb7-5857-4685-be1f-d57550cc96cc">false</CrawlForDependencies>
-    <InternalTagsTaxHTField0 xmlns="4873beb7-5857-4685-be1f-d57550cc96cc">
-      <Terms xmlns="http://schemas.microsoft.com/office/infopath/2007/PartnerControls"/>
-    </InternalTagsTaxHTField0>
-    <LastHandOff xmlns="4873beb7-5857-4685-be1f-d57550cc96cc" xsi:nil="true"/>
-    <Milestone xmlns="4873beb7-5857-4685-be1f-d57550cc96cc" xsi:nil="true"/>
-    <OriginalRelease xmlns="4873beb7-5857-4685-be1f-d57550cc96cc">15</OriginalRelease>
-    <RecommendationsModifier xmlns="4873beb7-5857-4685-be1f-d57550cc96cc" xsi:nil="true"/>
-    <ScenarioTagsTaxHTField0 xmlns="4873beb7-5857-4685-be1f-d57550cc96cc">
-      <Terms xmlns="http://schemas.microsoft.com/office/infopath/2007/PartnerControls"/>
-    </ScenarioTagsTaxHTField0>
-    <UANotes xmlns="4873beb7-5857-4685-be1f-d57550cc96cc" xsi:nil="true"/>
-  </documentManagement>
-</p:properties>
-</file>
-
-<file path=customXml/item3.xml><?xml version="1.0" encoding="utf-8"?>
 <ct:contentTypeSchema xmlns:ct="http://schemas.microsoft.com/office/2006/metadata/contentType" xmlns:ma="http://schemas.microsoft.com/office/2006/metadata/properties/metaAttributes" ct:_="" ma:_="" ma:contentTypeName="TemplateFile" ma:contentTypeID="0x0101006EDDDB5EE6D98C44930B742096920B300400F5B6D36B3EF94B4E9A635CDF2A18F5B8" ma:contentTypeVersion="72" ma:contentTypeDescription="Create a new document." ma:contentTypeScope="" ma:versionID="a23e56308344d904b51738559c3d67c9">
   <xsd:schema xmlns:xsd="http://www.w3.org/2001/XMLSchema" xmlns:xs="http://www.w3.org/2001/XMLSchema" xmlns:p="http://schemas.microsoft.com/office/2006/metadata/properties" xmlns:ns2="4873beb7-5857-4685-be1f-d57550cc96cc" targetNamespace="http://schemas.microsoft.com/office/2006/metadata/properties" ma:root="true" ma:fieldsID="cd0908cc4600e77bf5da051303e00c8d" ns2:_="">
     <xsd:import namespace="4873beb7-5857-4685-be1f-d57550cc96cc"/>
@@ -31355,6 +31229,132 @@
 </ct:contentTypeSchema>
 </file>
 
+<file path=customXml/item3.xml><?xml version="1.0" encoding="utf-8"?>
+<p:properties xmlns:p="http://schemas.microsoft.com/office/2006/metadata/properties" xmlns:xsi="http://www.w3.org/2001/XMLSchema-instance" xmlns:pc="http://schemas.microsoft.com/office/infopath/2007/PartnerControls">
+  <documentManagement>
+    <APDescription xmlns="4873beb7-5857-4685-be1f-d57550cc96cc" xsi:nil="true"/>
+    <AssetExpire xmlns="4873beb7-5857-4685-be1f-d57550cc96cc">2029-01-01T08:00:00+00:00</AssetExpire>
+    <CampaignTagsTaxHTField0 xmlns="4873beb7-5857-4685-be1f-d57550cc96cc">
+      <Terms xmlns="http://schemas.microsoft.com/office/infopath/2007/PartnerControls"/>
+    </CampaignTagsTaxHTField0>
+    <IntlLangReviewDate xmlns="4873beb7-5857-4685-be1f-d57550cc96cc" xsi:nil="true"/>
+    <TPFriendlyName xmlns="4873beb7-5857-4685-be1f-d57550cc96cc" xsi:nil="true"/>
+    <IntlLangReview xmlns="4873beb7-5857-4685-be1f-d57550cc96cc">false</IntlLangReview>
+    <LocLastLocAttemptVersionLookup xmlns="4873beb7-5857-4685-be1f-d57550cc96cc">855024</LocLastLocAttemptVersionLookup>
+    <PolicheckWords xmlns="4873beb7-5857-4685-be1f-d57550cc96cc" xsi:nil="true"/>
+    <SubmitterId xmlns="4873beb7-5857-4685-be1f-d57550cc96cc" xsi:nil="true"/>
+    <AcquiredFrom xmlns="4873beb7-5857-4685-be1f-d57550cc96cc">Internal MS</AcquiredFrom>
+    <EditorialStatus xmlns="4873beb7-5857-4685-be1f-d57550cc96cc">Complete</EditorialStatus>
+    <Markets xmlns="4873beb7-5857-4685-be1f-d57550cc96cc"/>
+    <OriginAsset xmlns="4873beb7-5857-4685-be1f-d57550cc96cc" xsi:nil="true"/>
+    <AssetStart xmlns="4873beb7-5857-4685-be1f-d57550cc96cc">2012-08-31T08:50:00+00:00</AssetStart>
+    <FriendlyTitle xmlns="4873beb7-5857-4685-be1f-d57550cc96cc" xsi:nil="true"/>
+    <MarketSpecific xmlns="4873beb7-5857-4685-be1f-d57550cc96cc">false</MarketSpecific>
+    <TPNamespace xmlns="4873beb7-5857-4685-be1f-d57550cc96cc" xsi:nil="true"/>
+    <PublishStatusLookup xmlns="4873beb7-5857-4685-be1f-d57550cc96cc">
+      <Value>1616423</Value>
+    </PublishStatusLookup>
+    <APAuthor xmlns="4873beb7-5857-4685-be1f-d57550cc96cc">
+      <UserInfo>
+        <DisplayName>REDMOND\kristaa</DisplayName>
+        <AccountId>136</AccountId>
+        <AccountType/>
+      </UserInfo>
+    </APAuthor>
+    <TPCommandLine xmlns="4873beb7-5857-4685-be1f-d57550cc96cc" xsi:nil="true"/>
+    <IntlLangReviewer xmlns="4873beb7-5857-4685-be1f-d57550cc96cc" xsi:nil="true"/>
+    <OpenTemplate xmlns="4873beb7-5857-4685-be1f-d57550cc96cc">true</OpenTemplate>
+    <CSXSubmissionDate xmlns="4873beb7-5857-4685-be1f-d57550cc96cc" xsi:nil="true"/>
+    <TaxCatchAll xmlns="4873beb7-5857-4685-be1f-d57550cc96cc"/>
+    <Manager xmlns="4873beb7-5857-4685-be1f-d57550cc96cc" xsi:nil="true"/>
+    <NumericId xmlns="4873beb7-5857-4685-be1f-d57550cc96cc" xsi:nil="true"/>
+    <ParentAssetId xmlns="4873beb7-5857-4685-be1f-d57550cc96cc" xsi:nil="true"/>
+    <OriginalSourceMarket xmlns="4873beb7-5857-4685-be1f-d57550cc96cc" xsi:nil="true"/>
+    <ApprovalStatus xmlns="4873beb7-5857-4685-be1f-d57550cc96cc">InProgress</ApprovalStatus>
+    <TPComponent xmlns="4873beb7-5857-4685-be1f-d57550cc96cc" xsi:nil="true"/>
+    <EditorialTags xmlns="4873beb7-5857-4685-be1f-d57550cc96cc" xsi:nil="true"/>
+    <TPExecutable xmlns="4873beb7-5857-4685-be1f-d57550cc96cc" xsi:nil="true"/>
+    <TPLaunchHelpLink xmlns="4873beb7-5857-4685-be1f-d57550cc96cc" xsi:nil="true"/>
+    <LocComments xmlns="4873beb7-5857-4685-be1f-d57550cc96cc" xsi:nil="true"/>
+    <LocRecommendedHandoff xmlns="4873beb7-5857-4685-be1f-d57550cc96cc" xsi:nil="true"/>
+    <SourceTitle xmlns="4873beb7-5857-4685-be1f-d57550cc96cc" xsi:nil="true"/>
+    <CSXUpdate xmlns="4873beb7-5857-4685-be1f-d57550cc96cc">false</CSXUpdate>
+    <IntlLocPriority xmlns="4873beb7-5857-4685-be1f-d57550cc96cc" xsi:nil="true"/>
+    <UAProjectedTotalWords xmlns="4873beb7-5857-4685-be1f-d57550cc96cc" xsi:nil="true"/>
+    <AssetType xmlns="4873beb7-5857-4685-be1f-d57550cc96cc">TP</AssetType>
+    <MachineTranslated xmlns="4873beb7-5857-4685-be1f-d57550cc96cc">false</MachineTranslated>
+    <OutputCachingOn xmlns="4873beb7-5857-4685-be1f-d57550cc96cc">false</OutputCachingOn>
+    <TemplateStatus xmlns="4873beb7-5857-4685-be1f-d57550cc96cc">Complete</TemplateStatus>
+    <IsSearchable xmlns="4873beb7-5857-4685-be1f-d57550cc96cc">true</IsSearchable>
+    <ContentItem xmlns="4873beb7-5857-4685-be1f-d57550cc96cc" xsi:nil="true"/>
+    <HandoffToMSDN xmlns="4873beb7-5857-4685-be1f-d57550cc96cc" xsi:nil="true"/>
+    <ShowIn xmlns="4873beb7-5857-4685-be1f-d57550cc96cc">Show everywhere</ShowIn>
+    <ThumbnailAssetId xmlns="4873beb7-5857-4685-be1f-d57550cc96cc" xsi:nil="true"/>
+    <UALocComments xmlns="4873beb7-5857-4685-be1f-d57550cc96cc" xsi:nil="true"/>
+    <UALocRecommendation xmlns="4873beb7-5857-4685-be1f-d57550cc96cc">Localize</UALocRecommendation>
+    <LastModifiedDateTime xmlns="4873beb7-5857-4685-be1f-d57550cc96cc" xsi:nil="true"/>
+    <LegacyData xmlns="4873beb7-5857-4685-be1f-d57550cc96cc" xsi:nil="true"/>
+    <LocManualTestRequired xmlns="4873beb7-5857-4685-be1f-d57550cc96cc">false</LocManualTestRequired>
+    <LocMarketGroupTiers2 xmlns="4873beb7-5857-4685-be1f-d57550cc96cc" xsi:nil="true"/>
+    <ClipArtFilename xmlns="4873beb7-5857-4685-be1f-d57550cc96cc" xsi:nil="true"/>
+    <TPApplication xmlns="4873beb7-5857-4685-be1f-d57550cc96cc" xsi:nil="true"/>
+    <CSXHash xmlns="4873beb7-5857-4685-be1f-d57550cc96cc" xsi:nil="true"/>
+    <DirectSourceMarket xmlns="4873beb7-5857-4685-be1f-d57550cc96cc" xsi:nil="true"/>
+    <PrimaryImageGen xmlns="4873beb7-5857-4685-be1f-d57550cc96cc">true</PrimaryImageGen>
+    <PlannedPubDate xmlns="4873beb7-5857-4685-be1f-d57550cc96cc" xsi:nil="true"/>
+    <CSXSubmissionMarket xmlns="4873beb7-5857-4685-be1f-d57550cc96cc" xsi:nil="true"/>
+    <Downloads xmlns="4873beb7-5857-4685-be1f-d57550cc96cc">0</Downloads>
+    <ArtSampleDocs xmlns="4873beb7-5857-4685-be1f-d57550cc96cc" xsi:nil="true"/>
+    <TrustLevel xmlns="4873beb7-5857-4685-be1f-d57550cc96cc">1 Microsoft Managed Content</TrustLevel>
+    <BlockPublish xmlns="4873beb7-5857-4685-be1f-d57550cc96cc">false</BlockPublish>
+    <TPLaunchHelpLinkType xmlns="4873beb7-5857-4685-be1f-d57550cc96cc">Template</TPLaunchHelpLinkType>
+    <LocalizationTagsTaxHTField0 xmlns="4873beb7-5857-4685-be1f-d57550cc96cc">
+      <Terms xmlns="http://schemas.microsoft.com/office/infopath/2007/PartnerControls"/>
+    </LocalizationTagsTaxHTField0>
+    <BusinessGroup xmlns="4873beb7-5857-4685-be1f-d57550cc96cc" xsi:nil="true"/>
+    <Providers xmlns="4873beb7-5857-4685-be1f-d57550cc96cc" xsi:nil="true"/>
+    <TemplateTemplateType xmlns="4873beb7-5857-4685-be1f-d57550cc96cc">PowerPoint Presentation Template</TemplateTemplateType>
+    <TimesCloned xmlns="4873beb7-5857-4685-be1f-d57550cc96cc" xsi:nil="true"/>
+    <TPAppVersion xmlns="4873beb7-5857-4685-be1f-d57550cc96cc" xsi:nil="true"/>
+    <VoteCount xmlns="4873beb7-5857-4685-be1f-d57550cc96cc" xsi:nil="true"/>
+    <AverageRating xmlns="4873beb7-5857-4685-be1f-d57550cc96cc" xsi:nil="true"/>
+    <FeatureTagsTaxHTField0 xmlns="4873beb7-5857-4685-be1f-d57550cc96cc">
+      <Terms xmlns="http://schemas.microsoft.com/office/infopath/2007/PartnerControls"/>
+    </FeatureTagsTaxHTField0>
+    <Provider xmlns="4873beb7-5857-4685-be1f-d57550cc96cc" xsi:nil="true"/>
+    <UACurrentWords xmlns="4873beb7-5857-4685-be1f-d57550cc96cc" xsi:nil="true"/>
+    <AssetId xmlns="4873beb7-5857-4685-be1f-d57550cc96cc">TP103431361</AssetId>
+    <TPClientViewer xmlns="4873beb7-5857-4685-be1f-d57550cc96cc" xsi:nil="true"/>
+    <DSATActionTaken xmlns="4873beb7-5857-4685-be1f-d57550cc96cc" xsi:nil="true"/>
+    <APEditor xmlns="4873beb7-5857-4685-be1f-d57550cc96cc">
+      <UserInfo>
+        <DisplayName/>
+        <AccountId xsi:nil="true"/>
+        <AccountType/>
+      </UserInfo>
+    </APEditor>
+    <TPInstallLocation xmlns="4873beb7-5857-4685-be1f-d57550cc96cc" xsi:nil="true"/>
+    <OOCacheId xmlns="4873beb7-5857-4685-be1f-d57550cc96cc" xsi:nil="true"/>
+    <IsDeleted xmlns="4873beb7-5857-4685-be1f-d57550cc96cc">false</IsDeleted>
+    <PublishTargets xmlns="4873beb7-5857-4685-be1f-d57550cc96cc">OfficeOnlineVNext</PublishTargets>
+    <ApprovalLog xmlns="4873beb7-5857-4685-be1f-d57550cc96cc" xsi:nil="true"/>
+    <BugNumber xmlns="4873beb7-5857-4685-be1f-d57550cc96cc" xsi:nil="true"/>
+    <CrawlForDependencies xmlns="4873beb7-5857-4685-be1f-d57550cc96cc">false</CrawlForDependencies>
+    <InternalTagsTaxHTField0 xmlns="4873beb7-5857-4685-be1f-d57550cc96cc">
+      <Terms xmlns="http://schemas.microsoft.com/office/infopath/2007/PartnerControls"/>
+    </InternalTagsTaxHTField0>
+    <LastHandOff xmlns="4873beb7-5857-4685-be1f-d57550cc96cc" xsi:nil="true"/>
+    <Milestone xmlns="4873beb7-5857-4685-be1f-d57550cc96cc" xsi:nil="true"/>
+    <OriginalRelease xmlns="4873beb7-5857-4685-be1f-d57550cc96cc">15</OriginalRelease>
+    <RecommendationsModifier xmlns="4873beb7-5857-4685-be1f-d57550cc96cc" xsi:nil="true"/>
+    <ScenarioTagsTaxHTField0 xmlns="4873beb7-5857-4685-be1f-d57550cc96cc">
+      <Terms xmlns="http://schemas.microsoft.com/office/infopath/2007/PartnerControls"/>
+    </ScenarioTagsTaxHTField0>
+    <UANotes xmlns="4873beb7-5857-4685-be1f-d57550cc96cc" xsi:nil="true"/>
+  </documentManagement>
+</p:properties>
+</file>
+
 <file path=customXml/itemProps1.xml><?xml version="1.0" encoding="utf-8"?>
 <ds:datastoreItem xmlns:ds="http://schemas.openxmlformats.org/officeDocument/2006/customXml" ds:itemID="{561E720F-F05D-4536-9C34-0CFCED65D3B7}">
   <ds:schemaRefs>
@@ -31364,22 +31364,6 @@
 </file>
 
 <file path=customXml/itemProps2.xml><?xml version="1.0" encoding="utf-8"?>
-<ds:datastoreItem xmlns:ds="http://schemas.openxmlformats.org/officeDocument/2006/customXml" ds:itemID="{8CDDBB83-77C1-4099-A0AA-289882E745E2}">
-  <ds:schemaRefs>
-    <ds:schemaRef ds:uri="http://purl.org/dc/dcmitype/"/>
-    <ds:schemaRef ds:uri="http://purl.org/dc/elements/1.1/"/>
-    <ds:schemaRef ds:uri="4873beb7-5857-4685-be1f-d57550cc96cc"/>
-    <ds:schemaRef ds:uri="http://schemas.microsoft.com/office/2006/metadata/properties"/>
-    <ds:schemaRef ds:uri="http://purl.org/dc/terms/"/>
-    <ds:schemaRef ds:uri="http://schemas.microsoft.com/office/2006/documentManagement/types"/>
-    <ds:schemaRef ds:uri="http://schemas.microsoft.com/office/infopath/2007/PartnerControls"/>
-    <ds:schemaRef ds:uri="http://schemas.openxmlformats.org/package/2006/metadata/core-properties"/>
-    <ds:schemaRef ds:uri="http://www.w3.org/XML/1998/namespace"/>
-  </ds:schemaRefs>
-</ds:datastoreItem>
-</file>
-
-<file path=customXml/itemProps3.xml><?xml version="1.0" encoding="utf-8"?>
 <ds:datastoreItem xmlns:ds="http://schemas.openxmlformats.org/officeDocument/2006/customXml" ds:itemID="{28C8B9CA-0273-4370-889A-FC05DA5C2FA5}">
   <ds:schemaRefs>
     <ds:schemaRef ds:uri="http://schemas.microsoft.com/office/2006/metadata/contentType"/>
@@ -31395,4 +31379,20 @@
     <ds:schemaRef ds:uri="http://schemas.microsoft.com/internal/obd"/>
   </ds:schemaRefs>
 </ds:datastoreItem>
+</file>
+
+<file path=customXml/itemProps3.xml><?xml version="1.0" encoding="utf-8"?>
+<ds:datastoreItem xmlns:ds="http://schemas.openxmlformats.org/officeDocument/2006/customXml" ds:itemID="{8CDDBB83-77C1-4099-A0AA-289882E745E2}">
+  <ds:schemaRefs>
+    <ds:schemaRef ds:uri="http://purl.org/dc/dcmitype/"/>
+    <ds:schemaRef ds:uri="http://purl.org/dc/elements/1.1/"/>
+    <ds:schemaRef ds:uri="4873beb7-5857-4685-be1f-d57550cc96cc"/>
+    <ds:schemaRef ds:uri="http://schemas.microsoft.com/office/2006/metadata/properties"/>
+    <ds:schemaRef ds:uri="http://purl.org/dc/terms/"/>
+    <ds:schemaRef ds:uri="http://schemas.microsoft.com/office/2006/documentManagement/types"/>
+    <ds:schemaRef ds:uri="http://schemas.microsoft.com/office/infopath/2007/PartnerControls"/>
+    <ds:schemaRef ds:uri="http://schemas.openxmlformats.org/package/2006/metadata/core-properties"/>
+    <ds:schemaRef ds:uri="http://www.w3.org/XML/1998/namespace"/>
+  </ds:schemaRefs>
+</ds:datastoreItem>
 </file>
</xml_diff>